<commit_message>
fixed up some of the html and css
</commit_message>
<xml_diff>
--- a/Assets/CPUGraphic.pptx
+++ b/Assets/CPUGraphic.pptx
@@ -6,8 +6,9 @@
   </p:sldMasterIdLst>
   <p:sldIdLst>
     <p:sldId id="256" r:id="rId2"/>
-    <p:sldId id="257" r:id="rId3"/>
-    <p:sldId id="258" r:id="rId4"/>
+    <p:sldId id="259" r:id="rId3"/>
+    <p:sldId id="257" r:id="rId4"/>
+    <p:sldId id="258" r:id="rId5"/>
   </p:sldIdLst>
   <p:sldSz cx="12192000" cy="6858000"/>
   <p:notesSz cx="6858000" cy="9144000"/>
@@ -256,7 +257,7 @@
           <a:p>
             <a:fld id="{2A6E20DB-E484-4B89-ABAC-480B155DCA05}" type="datetimeFigureOut">
               <a:rPr lang="en-US" smtClean="0"/>
-              <a:t>10/3/2018</a:t>
+              <a:t>10/26/2018</a:t>
             </a:fld>
             <a:endParaRPr lang="en-US"/>
           </a:p>
@@ -426,7 +427,7 @@
           <a:p>
             <a:fld id="{2A6E20DB-E484-4B89-ABAC-480B155DCA05}" type="datetimeFigureOut">
               <a:rPr lang="en-US" smtClean="0"/>
-              <a:t>10/3/2018</a:t>
+              <a:t>10/26/2018</a:t>
             </a:fld>
             <a:endParaRPr lang="en-US"/>
           </a:p>
@@ -606,7 +607,7 @@
           <a:p>
             <a:fld id="{2A6E20DB-E484-4B89-ABAC-480B155DCA05}" type="datetimeFigureOut">
               <a:rPr lang="en-US" smtClean="0"/>
-              <a:t>10/3/2018</a:t>
+              <a:t>10/26/2018</a:t>
             </a:fld>
             <a:endParaRPr lang="en-US"/>
           </a:p>
@@ -776,7 +777,7 @@
           <a:p>
             <a:fld id="{2A6E20DB-E484-4B89-ABAC-480B155DCA05}" type="datetimeFigureOut">
               <a:rPr lang="en-US" smtClean="0"/>
-              <a:t>10/3/2018</a:t>
+              <a:t>10/26/2018</a:t>
             </a:fld>
             <a:endParaRPr lang="en-US"/>
           </a:p>
@@ -1022,7 +1023,7 @@
           <a:p>
             <a:fld id="{2A6E20DB-E484-4B89-ABAC-480B155DCA05}" type="datetimeFigureOut">
               <a:rPr lang="en-US" smtClean="0"/>
-              <a:t>10/3/2018</a:t>
+              <a:t>10/26/2018</a:t>
             </a:fld>
             <a:endParaRPr lang="en-US"/>
           </a:p>
@@ -1254,7 +1255,7 @@
           <a:p>
             <a:fld id="{2A6E20DB-E484-4B89-ABAC-480B155DCA05}" type="datetimeFigureOut">
               <a:rPr lang="en-US" smtClean="0"/>
-              <a:t>10/3/2018</a:t>
+              <a:t>10/26/2018</a:t>
             </a:fld>
             <a:endParaRPr lang="en-US"/>
           </a:p>
@@ -1621,7 +1622,7 @@
           <a:p>
             <a:fld id="{2A6E20DB-E484-4B89-ABAC-480B155DCA05}" type="datetimeFigureOut">
               <a:rPr lang="en-US" smtClean="0"/>
-              <a:t>10/3/2018</a:t>
+              <a:t>10/26/2018</a:t>
             </a:fld>
             <a:endParaRPr lang="en-US"/>
           </a:p>
@@ -1739,7 +1740,7 @@
           <a:p>
             <a:fld id="{2A6E20DB-E484-4B89-ABAC-480B155DCA05}" type="datetimeFigureOut">
               <a:rPr lang="en-US" smtClean="0"/>
-              <a:t>10/3/2018</a:t>
+              <a:t>10/26/2018</a:t>
             </a:fld>
             <a:endParaRPr lang="en-US"/>
           </a:p>
@@ -1834,7 +1835,7 @@
           <a:p>
             <a:fld id="{2A6E20DB-E484-4B89-ABAC-480B155DCA05}" type="datetimeFigureOut">
               <a:rPr lang="en-US" smtClean="0"/>
-              <a:t>10/3/2018</a:t>
+              <a:t>10/26/2018</a:t>
             </a:fld>
             <a:endParaRPr lang="en-US"/>
           </a:p>
@@ -2111,7 +2112,7 @@
           <a:p>
             <a:fld id="{2A6E20DB-E484-4B89-ABAC-480B155DCA05}" type="datetimeFigureOut">
               <a:rPr lang="en-US" smtClean="0"/>
-              <a:t>10/3/2018</a:t>
+              <a:t>10/26/2018</a:t>
             </a:fld>
             <a:endParaRPr lang="en-US"/>
           </a:p>
@@ -2364,7 +2365,7 @@
           <a:p>
             <a:fld id="{2A6E20DB-E484-4B89-ABAC-480B155DCA05}" type="datetimeFigureOut">
               <a:rPr lang="en-US" smtClean="0"/>
-              <a:t>10/3/2018</a:t>
+              <a:t>10/26/2018</a:t>
             </a:fld>
             <a:endParaRPr lang="en-US"/>
           </a:p>
@@ -2582,7 +2583,7 @@
           <a:p>
             <a:fld id="{2A6E20DB-E484-4B89-ABAC-480B155DCA05}" type="datetimeFigureOut">
               <a:rPr lang="en-US" smtClean="0"/>
-              <a:t>10/3/2018</a:t>
+              <a:t>10/26/2018</a:t>
             </a:fld>
             <a:endParaRPr lang="en-US"/>
           </a:p>
@@ -4394,6 +4395,35 @@
           </p:grpSp>
         </p:grpSp>
       </p:grpSp>
+      <p:sp>
+        <p:nvSpPr>
+          <p:cNvPr id="2" name="Rectangle 1"/>
+          <p:cNvSpPr/>
+          <p:nvPr/>
+        </p:nvSpPr>
+        <p:spPr>
+          <a:xfrm>
+            <a:off x="4951418" y="2648652"/>
+            <a:ext cx="2268570" cy="1569660"/>
+          </a:xfrm>
+          <a:prstGeom prst="rect">
+            <a:avLst/>
+          </a:prstGeom>
+        </p:spPr>
+        <p:txBody>
+          <a:bodyPr wrap="none">
+            <a:spAutoFit/>
+          </a:bodyPr>
+          <a:lstStyle/>
+          <a:p>
+            <a:r>
+              <a:rPr lang="en-US" sz="9600" dirty="0"/>
+              <a:t>CPU</a:t>
+            </a:r>
+            <a:endParaRPr lang="en-US" sz="9600" dirty="0"/>
+          </a:p>
+        </p:txBody>
+      </p:sp>
     </p:spTree>
     <p:extLst>
       <p:ext uri="{BB962C8B-B14F-4D97-AF65-F5344CB8AC3E}">
@@ -4408,6 +4438,1476 @@
 </file>
 
 <file path=ppt/slides/slide2.xml><?xml version="1.0" encoding="utf-8"?>
+<p:sld xmlns:a="http://schemas.openxmlformats.org/drawingml/2006/main" xmlns:r="http://schemas.openxmlformats.org/officeDocument/2006/relationships" xmlns:p="http://schemas.openxmlformats.org/presentationml/2006/main">
+  <p:cSld>
+    <p:spTree>
+      <p:nvGrpSpPr>
+        <p:cNvPr id="1" name=""/>
+        <p:cNvGrpSpPr/>
+        <p:nvPr/>
+      </p:nvGrpSpPr>
+      <p:grpSpPr>
+        <a:xfrm>
+          <a:off x="0" y="0"/>
+          <a:ext cx="0" cy="0"/>
+          <a:chOff x="0" y="0"/>
+          <a:chExt cx="0" cy="0"/>
+        </a:xfrm>
+      </p:grpSpPr>
+      <p:grpSp>
+        <p:nvGrpSpPr>
+          <p:cNvPr id="2" name="Group 1"/>
+          <p:cNvGrpSpPr/>
+          <p:nvPr/>
+        </p:nvGrpSpPr>
+        <p:grpSpPr>
+          <a:xfrm>
+            <a:off x="3375213" y="1640541"/>
+            <a:ext cx="5423642" cy="3585882"/>
+            <a:chOff x="3370733" y="1640541"/>
+            <a:chExt cx="5423642" cy="3585882"/>
+          </a:xfrm>
+        </p:grpSpPr>
+        <p:sp>
+          <p:nvSpPr>
+            <p:cNvPr id="3" name="Rectangle 2"/>
+            <p:cNvSpPr/>
+            <p:nvPr/>
+          </p:nvSpPr>
+          <p:spPr>
+            <a:xfrm>
+              <a:off x="4267200" y="2519082"/>
+              <a:ext cx="3639671" cy="1828800"/>
+            </a:xfrm>
+            <a:prstGeom prst="rect">
+              <a:avLst/>
+            </a:prstGeom>
+            <a:solidFill>
+              <a:schemeClr val="accent1">
+                <a:lumMod val="60000"/>
+                <a:lumOff val="40000"/>
+              </a:schemeClr>
+            </a:solidFill>
+            <a:ln w="76200">
+              <a:solidFill>
+                <a:schemeClr val="bg1"/>
+              </a:solidFill>
+            </a:ln>
+          </p:spPr>
+          <p:style>
+            <a:lnRef idx="2">
+              <a:schemeClr val="accent1">
+                <a:shade val="50000"/>
+              </a:schemeClr>
+            </a:lnRef>
+            <a:fillRef idx="1">
+              <a:schemeClr val="accent1"/>
+            </a:fillRef>
+            <a:effectRef idx="0">
+              <a:schemeClr val="accent1"/>
+            </a:effectRef>
+            <a:fontRef idx="minor">
+              <a:schemeClr val="lt1"/>
+            </a:fontRef>
+          </p:style>
+          <p:txBody>
+            <a:bodyPr rtlCol="0" anchor="ctr"/>
+            <a:lstStyle/>
+            <a:p>
+              <a:pPr algn="ctr"/>
+              <a:endParaRPr lang="en-US"/>
+            </a:p>
+          </p:txBody>
+        </p:sp>
+        <p:grpSp>
+          <p:nvGrpSpPr>
+            <p:cNvPr id="4" name="Group 3"/>
+            <p:cNvGrpSpPr/>
+            <p:nvPr/>
+          </p:nvGrpSpPr>
+          <p:grpSpPr>
+            <a:xfrm>
+              <a:off x="5038165" y="1640541"/>
+              <a:ext cx="2115670" cy="878541"/>
+              <a:chOff x="5038165" y="1640541"/>
+              <a:chExt cx="2115670" cy="878541"/>
+            </a:xfrm>
+          </p:grpSpPr>
+          <p:grpSp>
+            <p:nvGrpSpPr>
+              <p:cNvPr id="35" name="Group 34"/>
+              <p:cNvGrpSpPr/>
+              <p:nvPr/>
+            </p:nvGrpSpPr>
+            <p:grpSpPr>
+              <a:xfrm>
+                <a:off x="5038165" y="1640541"/>
+                <a:ext cx="277906" cy="878541"/>
+                <a:chOff x="5038165" y="1640541"/>
+                <a:chExt cx="277906" cy="878541"/>
+              </a:xfrm>
+            </p:grpSpPr>
+            <p:sp>
+              <p:nvSpPr>
+                <p:cNvPr id="42" name="Rectangle 41"/>
+                <p:cNvSpPr/>
+                <p:nvPr/>
+              </p:nvSpPr>
+              <p:spPr>
+                <a:xfrm>
+                  <a:off x="5109882" y="1837765"/>
+                  <a:ext cx="143436" cy="681317"/>
+                </a:xfrm>
+                <a:prstGeom prst="rect">
+                  <a:avLst/>
+                </a:prstGeom>
+                <a:solidFill>
+                  <a:schemeClr val="bg1"/>
+                </a:solidFill>
+                <a:ln>
+                  <a:noFill/>
+                </a:ln>
+              </p:spPr>
+              <p:style>
+                <a:lnRef idx="2">
+                  <a:schemeClr val="accent1">
+                    <a:shade val="50000"/>
+                  </a:schemeClr>
+                </a:lnRef>
+                <a:fillRef idx="1">
+                  <a:schemeClr val="accent1"/>
+                </a:fillRef>
+                <a:effectRef idx="0">
+                  <a:schemeClr val="accent1"/>
+                </a:effectRef>
+                <a:fontRef idx="minor">
+                  <a:schemeClr val="lt1"/>
+                </a:fontRef>
+              </p:style>
+              <p:txBody>
+                <a:bodyPr rtlCol="0" anchor="ctr"/>
+                <a:lstStyle/>
+                <a:p>
+                  <a:pPr algn="ctr"/>
+                  <a:endParaRPr lang="en-US"/>
+                </a:p>
+              </p:txBody>
+            </p:sp>
+            <p:sp>
+              <p:nvSpPr>
+                <p:cNvPr id="43" name="Oval 42"/>
+                <p:cNvSpPr/>
+                <p:nvPr/>
+              </p:nvSpPr>
+              <p:spPr>
+                <a:xfrm>
+                  <a:off x="5038165" y="1640541"/>
+                  <a:ext cx="277906" cy="259977"/>
+                </a:xfrm>
+                <a:prstGeom prst="ellipse">
+                  <a:avLst/>
+                </a:prstGeom>
+                <a:solidFill>
+                  <a:schemeClr val="bg1"/>
+                </a:solidFill>
+                <a:ln>
+                  <a:noFill/>
+                </a:ln>
+              </p:spPr>
+              <p:style>
+                <a:lnRef idx="2">
+                  <a:schemeClr val="accent1">
+                    <a:shade val="50000"/>
+                  </a:schemeClr>
+                </a:lnRef>
+                <a:fillRef idx="1">
+                  <a:schemeClr val="accent1"/>
+                </a:fillRef>
+                <a:effectRef idx="0">
+                  <a:schemeClr val="accent1"/>
+                </a:effectRef>
+                <a:fontRef idx="minor">
+                  <a:schemeClr val="lt1"/>
+                </a:fontRef>
+              </p:style>
+              <p:txBody>
+                <a:bodyPr rtlCol="0" anchor="ctr"/>
+                <a:lstStyle/>
+                <a:p>
+                  <a:pPr algn="ctr"/>
+                  <a:endParaRPr lang="en-US"/>
+                </a:p>
+              </p:txBody>
+            </p:sp>
+          </p:grpSp>
+          <p:grpSp>
+            <p:nvGrpSpPr>
+              <p:cNvPr id="36" name="Group 35"/>
+              <p:cNvGrpSpPr/>
+              <p:nvPr/>
+            </p:nvGrpSpPr>
+            <p:grpSpPr>
+              <a:xfrm>
+                <a:off x="5957047" y="1640541"/>
+                <a:ext cx="277906" cy="878541"/>
+                <a:chOff x="5038165" y="1640541"/>
+                <a:chExt cx="277906" cy="878541"/>
+              </a:xfrm>
+            </p:grpSpPr>
+            <p:sp>
+              <p:nvSpPr>
+                <p:cNvPr id="40" name="Rectangle 39"/>
+                <p:cNvSpPr/>
+                <p:nvPr/>
+              </p:nvSpPr>
+              <p:spPr>
+                <a:xfrm>
+                  <a:off x="5109882" y="1837765"/>
+                  <a:ext cx="143436" cy="681317"/>
+                </a:xfrm>
+                <a:prstGeom prst="rect">
+                  <a:avLst/>
+                </a:prstGeom>
+                <a:solidFill>
+                  <a:schemeClr val="bg1"/>
+                </a:solidFill>
+                <a:ln>
+                  <a:noFill/>
+                </a:ln>
+              </p:spPr>
+              <p:style>
+                <a:lnRef idx="2">
+                  <a:schemeClr val="accent1">
+                    <a:shade val="50000"/>
+                  </a:schemeClr>
+                </a:lnRef>
+                <a:fillRef idx="1">
+                  <a:schemeClr val="accent1"/>
+                </a:fillRef>
+                <a:effectRef idx="0">
+                  <a:schemeClr val="accent1"/>
+                </a:effectRef>
+                <a:fontRef idx="minor">
+                  <a:schemeClr val="lt1"/>
+                </a:fontRef>
+              </p:style>
+              <p:txBody>
+                <a:bodyPr rtlCol="0" anchor="ctr"/>
+                <a:lstStyle/>
+                <a:p>
+                  <a:pPr algn="ctr"/>
+                  <a:endParaRPr lang="en-US"/>
+                </a:p>
+              </p:txBody>
+            </p:sp>
+            <p:sp>
+              <p:nvSpPr>
+                <p:cNvPr id="41" name="Oval 40"/>
+                <p:cNvSpPr/>
+                <p:nvPr/>
+              </p:nvSpPr>
+              <p:spPr>
+                <a:xfrm>
+                  <a:off x="5038165" y="1640541"/>
+                  <a:ext cx="277906" cy="259977"/>
+                </a:xfrm>
+                <a:prstGeom prst="ellipse">
+                  <a:avLst/>
+                </a:prstGeom>
+                <a:solidFill>
+                  <a:schemeClr val="bg1"/>
+                </a:solidFill>
+                <a:ln>
+                  <a:noFill/>
+                </a:ln>
+              </p:spPr>
+              <p:style>
+                <a:lnRef idx="2">
+                  <a:schemeClr val="accent1">
+                    <a:shade val="50000"/>
+                  </a:schemeClr>
+                </a:lnRef>
+                <a:fillRef idx="1">
+                  <a:schemeClr val="accent1"/>
+                </a:fillRef>
+                <a:effectRef idx="0">
+                  <a:schemeClr val="accent1"/>
+                </a:effectRef>
+                <a:fontRef idx="minor">
+                  <a:schemeClr val="lt1"/>
+                </a:fontRef>
+              </p:style>
+              <p:txBody>
+                <a:bodyPr rtlCol="0" anchor="ctr"/>
+                <a:lstStyle/>
+                <a:p>
+                  <a:pPr algn="ctr"/>
+                  <a:endParaRPr lang="en-US"/>
+                </a:p>
+              </p:txBody>
+            </p:sp>
+          </p:grpSp>
+          <p:grpSp>
+            <p:nvGrpSpPr>
+              <p:cNvPr id="37" name="Group 36"/>
+              <p:cNvGrpSpPr/>
+              <p:nvPr/>
+            </p:nvGrpSpPr>
+            <p:grpSpPr>
+              <a:xfrm>
+                <a:off x="6875929" y="1640541"/>
+                <a:ext cx="277906" cy="878541"/>
+                <a:chOff x="5038165" y="1640541"/>
+                <a:chExt cx="277906" cy="878541"/>
+              </a:xfrm>
+            </p:grpSpPr>
+            <p:sp>
+              <p:nvSpPr>
+                <p:cNvPr id="38" name="Rectangle 37"/>
+                <p:cNvSpPr/>
+                <p:nvPr/>
+              </p:nvSpPr>
+              <p:spPr>
+                <a:xfrm>
+                  <a:off x="5109882" y="1837765"/>
+                  <a:ext cx="143436" cy="681317"/>
+                </a:xfrm>
+                <a:prstGeom prst="rect">
+                  <a:avLst/>
+                </a:prstGeom>
+                <a:solidFill>
+                  <a:schemeClr val="bg1"/>
+                </a:solidFill>
+                <a:ln>
+                  <a:noFill/>
+                </a:ln>
+              </p:spPr>
+              <p:style>
+                <a:lnRef idx="2">
+                  <a:schemeClr val="accent1">
+                    <a:shade val="50000"/>
+                  </a:schemeClr>
+                </a:lnRef>
+                <a:fillRef idx="1">
+                  <a:schemeClr val="accent1"/>
+                </a:fillRef>
+                <a:effectRef idx="0">
+                  <a:schemeClr val="accent1"/>
+                </a:effectRef>
+                <a:fontRef idx="minor">
+                  <a:schemeClr val="lt1"/>
+                </a:fontRef>
+              </p:style>
+              <p:txBody>
+                <a:bodyPr rtlCol="0" anchor="ctr"/>
+                <a:lstStyle/>
+                <a:p>
+                  <a:pPr algn="ctr"/>
+                  <a:endParaRPr lang="en-US"/>
+                </a:p>
+              </p:txBody>
+            </p:sp>
+            <p:sp>
+              <p:nvSpPr>
+                <p:cNvPr id="39" name="Oval 38"/>
+                <p:cNvSpPr/>
+                <p:nvPr/>
+              </p:nvSpPr>
+              <p:spPr>
+                <a:xfrm>
+                  <a:off x="5038165" y="1640541"/>
+                  <a:ext cx="277906" cy="259977"/>
+                </a:xfrm>
+                <a:prstGeom prst="ellipse">
+                  <a:avLst/>
+                </a:prstGeom>
+                <a:solidFill>
+                  <a:schemeClr val="bg1"/>
+                </a:solidFill>
+                <a:ln>
+                  <a:noFill/>
+                </a:ln>
+              </p:spPr>
+              <p:style>
+                <a:lnRef idx="2">
+                  <a:schemeClr val="accent1">
+                    <a:shade val="50000"/>
+                  </a:schemeClr>
+                </a:lnRef>
+                <a:fillRef idx="1">
+                  <a:schemeClr val="accent1"/>
+                </a:fillRef>
+                <a:effectRef idx="0">
+                  <a:schemeClr val="accent1"/>
+                </a:effectRef>
+                <a:fontRef idx="minor">
+                  <a:schemeClr val="lt1"/>
+                </a:fontRef>
+              </p:style>
+              <p:txBody>
+                <a:bodyPr rtlCol="0" anchor="ctr"/>
+                <a:lstStyle/>
+                <a:p>
+                  <a:pPr algn="ctr"/>
+                  <a:endParaRPr lang="en-US"/>
+                </a:p>
+              </p:txBody>
+            </p:sp>
+          </p:grpSp>
+        </p:grpSp>
+        <p:grpSp>
+          <p:nvGrpSpPr>
+            <p:cNvPr id="5" name="Group 4"/>
+            <p:cNvGrpSpPr/>
+            <p:nvPr/>
+          </p:nvGrpSpPr>
+          <p:grpSpPr>
+            <a:xfrm>
+              <a:off x="7906871" y="2671483"/>
+              <a:ext cx="887504" cy="1519517"/>
+              <a:chOff x="7906871" y="2671483"/>
+              <a:chExt cx="887504" cy="1519517"/>
+            </a:xfrm>
+          </p:grpSpPr>
+          <p:grpSp>
+            <p:nvGrpSpPr>
+              <p:cNvPr id="26" name="Group 25"/>
+              <p:cNvGrpSpPr/>
+              <p:nvPr/>
+            </p:nvGrpSpPr>
+            <p:grpSpPr>
+              <a:xfrm rot="5400000">
+                <a:off x="8207189" y="3612776"/>
+                <a:ext cx="277906" cy="878541"/>
+                <a:chOff x="5038165" y="1640541"/>
+                <a:chExt cx="277906" cy="878541"/>
+              </a:xfrm>
+            </p:grpSpPr>
+            <p:sp>
+              <p:nvSpPr>
+                <p:cNvPr id="33" name="Rectangle 32"/>
+                <p:cNvSpPr/>
+                <p:nvPr/>
+              </p:nvSpPr>
+              <p:spPr>
+                <a:xfrm>
+                  <a:off x="5109882" y="1837765"/>
+                  <a:ext cx="143436" cy="681317"/>
+                </a:xfrm>
+                <a:prstGeom prst="rect">
+                  <a:avLst/>
+                </a:prstGeom>
+                <a:solidFill>
+                  <a:schemeClr val="bg1"/>
+                </a:solidFill>
+                <a:ln>
+                  <a:noFill/>
+                </a:ln>
+              </p:spPr>
+              <p:style>
+                <a:lnRef idx="2">
+                  <a:schemeClr val="accent1">
+                    <a:shade val="50000"/>
+                  </a:schemeClr>
+                </a:lnRef>
+                <a:fillRef idx="1">
+                  <a:schemeClr val="accent1"/>
+                </a:fillRef>
+                <a:effectRef idx="0">
+                  <a:schemeClr val="accent1"/>
+                </a:effectRef>
+                <a:fontRef idx="minor">
+                  <a:schemeClr val="lt1"/>
+                </a:fontRef>
+              </p:style>
+              <p:txBody>
+                <a:bodyPr rtlCol="0" anchor="ctr"/>
+                <a:lstStyle/>
+                <a:p>
+                  <a:pPr algn="ctr"/>
+                  <a:endParaRPr lang="en-US"/>
+                </a:p>
+              </p:txBody>
+            </p:sp>
+            <p:sp>
+              <p:nvSpPr>
+                <p:cNvPr id="34" name="Oval 33"/>
+                <p:cNvSpPr/>
+                <p:nvPr/>
+              </p:nvSpPr>
+              <p:spPr>
+                <a:xfrm>
+                  <a:off x="5038165" y="1640541"/>
+                  <a:ext cx="277906" cy="259977"/>
+                </a:xfrm>
+                <a:prstGeom prst="ellipse">
+                  <a:avLst/>
+                </a:prstGeom>
+                <a:solidFill>
+                  <a:schemeClr val="bg1"/>
+                </a:solidFill>
+                <a:ln>
+                  <a:noFill/>
+                </a:ln>
+              </p:spPr>
+              <p:style>
+                <a:lnRef idx="2">
+                  <a:schemeClr val="accent1">
+                    <a:shade val="50000"/>
+                  </a:schemeClr>
+                </a:lnRef>
+                <a:fillRef idx="1">
+                  <a:schemeClr val="accent1"/>
+                </a:fillRef>
+                <a:effectRef idx="0">
+                  <a:schemeClr val="accent1"/>
+                </a:effectRef>
+                <a:fontRef idx="minor">
+                  <a:schemeClr val="lt1"/>
+                </a:fontRef>
+              </p:style>
+              <p:txBody>
+                <a:bodyPr rtlCol="0" anchor="ctr"/>
+                <a:lstStyle/>
+                <a:p>
+                  <a:pPr algn="ctr"/>
+                  <a:endParaRPr lang="en-US"/>
+                </a:p>
+              </p:txBody>
+            </p:sp>
+          </p:grpSp>
+          <p:grpSp>
+            <p:nvGrpSpPr>
+              <p:cNvPr id="27" name="Group 26"/>
+              <p:cNvGrpSpPr/>
+              <p:nvPr/>
+            </p:nvGrpSpPr>
+            <p:grpSpPr>
+              <a:xfrm rot="5400000">
+                <a:off x="8211672" y="2994212"/>
+                <a:ext cx="277906" cy="878541"/>
+                <a:chOff x="5038165" y="1640541"/>
+                <a:chExt cx="277906" cy="878541"/>
+              </a:xfrm>
+            </p:grpSpPr>
+            <p:sp>
+              <p:nvSpPr>
+                <p:cNvPr id="31" name="Rectangle 30"/>
+                <p:cNvSpPr/>
+                <p:nvPr/>
+              </p:nvSpPr>
+              <p:spPr>
+                <a:xfrm>
+                  <a:off x="5109882" y="1837765"/>
+                  <a:ext cx="143436" cy="681317"/>
+                </a:xfrm>
+                <a:prstGeom prst="rect">
+                  <a:avLst/>
+                </a:prstGeom>
+                <a:solidFill>
+                  <a:schemeClr val="bg1"/>
+                </a:solidFill>
+                <a:ln>
+                  <a:noFill/>
+                </a:ln>
+              </p:spPr>
+              <p:style>
+                <a:lnRef idx="2">
+                  <a:schemeClr val="accent1">
+                    <a:shade val="50000"/>
+                  </a:schemeClr>
+                </a:lnRef>
+                <a:fillRef idx="1">
+                  <a:schemeClr val="accent1"/>
+                </a:fillRef>
+                <a:effectRef idx="0">
+                  <a:schemeClr val="accent1"/>
+                </a:effectRef>
+                <a:fontRef idx="minor">
+                  <a:schemeClr val="lt1"/>
+                </a:fontRef>
+              </p:style>
+              <p:txBody>
+                <a:bodyPr rtlCol="0" anchor="ctr"/>
+                <a:lstStyle/>
+                <a:p>
+                  <a:pPr algn="ctr"/>
+                  <a:endParaRPr lang="en-US"/>
+                </a:p>
+              </p:txBody>
+            </p:sp>
+            <p:sp>
+              <p:nvSpPr>
+                <p:cNvPr id="32" name="Oval 31"/>
+                <p:cNvSpPr/>
+                <p:nvPr/>
+              </p:nvSpPr>
+              <p:spPr>
+                <a:xfrm>
+                  <a:off x="5038165" y="1640541"/>
+                  <a:ext cx="277906" cy="259977"/>
+                </a:xfrm>
+                <a:prstGeom prst="ellipse">
+                  <a:avLst/>
+                </a:prstGeom>
+                <a:solidFill>
+                  <a:schemeClr val="bg1"/>
+                </a:solidFill>
+                <a:ln>
+                  <a:noFill/>
+                </a:ln>
+              </p:spPr>
+              <p:style>
+                <a:lnRef idx="2">
+                  <a:schemeClr val="accent1">
+                    <a:shade val="50000"/>
+                  </a:schemeClr>
+                </a:lnRef>
+                <a:fillRef idx="1">
+                  <a:schemeClr val="accent1"/>
+                </a:fillRef>
+                <a:effectRef idx="0">
+                  <a:schemeClr val="accent1"/>
+                </a:effectRef>
+                <a:fontRef idx="minor">
+                  <a:schemeClr val="lt1"/>
+                </a:fontRef>
+              </p:style>
+              <p:txBody>
+                <a:bodyPr rtlCol="0" anchor="ctr"/>
+                <a:lstStyle/>
+                <a:p>
+                  <a:pPr algn="ctr"/>
+                  <a:endParaRPr lang="en-US"/>
+                </a:p>
+              </p:txBody>
+            </p:sp>
+          </p:grpSp>
+          <p:grpSp>
+            <p:nvGrpSpPr>
+              <p:cNvPr id="28" name="Group 27"/>
+              <p:cNvGrpSpPr/>
+              <p:nvPr/>
+            </p:nvGrpSpPr>
+            <p:grpSpPr>
+              <a:xfrm rot="5400000">
+                <a:off x="8216152" y="2371165"/>
+                <a:ext cx="277906" cy="878541"/>
+                <a:chOff x="5038165" y="1640541"/>
+                <a:chExt cx="277906" cy="878541"/>
+              </a:xfrm>
+            </p:grpSpPr>
+            <p:sp>
+              <p:nvSpPr>
+                <p:cNvPr id="29" name="Rectangle 28"/>
+                <p:cNvSpPr/>
+                <p:nvPr/>
+              </p:nvSpPr>
+              <p:spPr>
+                <a:xfrm>
+                  <a:off x="5109882" y="1837765"/>
+                  <a:ext cx="143436" cy="681317"/>
+                </a:xfrm>
+                <a:prstGeom prst="rect">
+                  <a:avLst/>
+                </a:prstGeom>
+                <a:solidFill>
+                  <a:schemeClr val="bg1"/>
+                </a:solidFill>
+                <a:ln>
+                  <a:noFill/>
+                </a:ln>
+              </p:spPr>
+              <p:style>
+                <a:lnRef idx="2">
+                  <a:schemeClr val="accent1">
+                    <a:shade val="50000"/>
+                  </a:schemeClr>
+                </a:lnRef>
+                <a:fillRef idx="1">
+                  <a:schemeClr val="accent1"/>
+                </a:fillRef>
+                <a:effectRef idx="0">
+                  <a:schemeClr val="accent1"/>
+                </a:effectRef>
+                <a:fontRef idx="minor">
+                  <a:schemeClr val="lt1"/>
+                </a:fontRef>
+              </p:style>
+              <p:txBody>
+                <a:bodyPr rtlCol="0" anchor="ctr"/>
+                <a:lstStyle/>
+                <a:p>
+                  <a:pPr algn="ctr"/>
+                  <a:endParaRPr lang="en-US"/>
+                </a:p>
+              </p:txBody>
+            </p:sp>
+            <p:sp>
+              <p:nvSpPr>
+                <p:cNvPr id="30" name="Oval 29"/>
+                <p:cNvSpPr/>
+                <p:nvPr/>
+              </p:nvSpPr>
+              <p:spPr>
+                <a:xfrm>
+                  <a:off x="5038165" y="1640541"/>
+                  <a:ext cx="277906" cy="259977"/>
+                </a:xfrm>
+                <a:prstGeom prst="ellipse">
+                  <a:avLst/>
+                </a:prstGeom>
+                <a:solidFill>
+                  <a:schemeClr val="bg1"/>
+                </a:solidFill>
+                <a:ln>
+                  <a:noFill/>
+                </a:ln>
+              </p:spPr>
+              <p:style>
+                <a:lnRef idx="2">
+                  <a:schemeClr val="accent1">
+                    <a:shade val="50000"/>
+                  </a:schemeClr>
+                </a:lnRef>
+                <a:fillRef idx="1">
+                  <a:schemeClr val="accent1"/>
+                </a:fillRef>
+                <a:effectRef idx="0">
+                  <a:schemeClr val="accent1"/>
+                </a:effectRef>
+                <a:fontRef idx="minor">
+                  <a:schemeClr val="lt1"/>
+                </a:fontRef>
+              </p:style>
+              <p:txBody>
+                <a:bodyPr rtlCol="0" anchor="ctr"/>
+                <a:lstStyle/>
+                <a:p>
+                  <a:pPr algn="ctr"/>
+                  <a:endParaRPr lang="en-US"/>
+                </a:p>
+              </p:txBody>
+            </p:sp>
+          </p:grpSp>
+        </p:grpSp>
+        <p:grpSp>
+          <p:nvGrpSpPr>
+            <p:cNvPr id="6" name="Group 5"/>
+            <p:cNvGrpSpPr/>
+            <p:nvPr/>
+          </p:nvGrpSpPr>
+          <p:grpSpPr>
+            <a:xfrm rot="10800000">
+              <a:off x="5038165" y="4347882"/>
+              <a:ext cx="2115670" cy="878541"/>
+              <a:chOff x="5038165" y="1640541"/>
+              <a:chExt cx="2115670" cy="878541"/>
+            </a:xfrm>
+          </p:grpSpPr>
+          <p:grpSp>
+            <p:nvGrpSpPr>
+              <p:cNvPr id="17" name="Group 16"/>
+              <p:cNvGrpSpPr/>
+              <p:nvPr/>
+            </p:nvGrpSpPr>
+            <p:grpSpPr>
+              <a:xfrm>
+                <a:off x="5038165" y="1640541"/>
+                <a:ext cx="277906" cy="878541"/>
+                <a:chOff x="5038165" y="1640541"/>
+                <a:chExt cx="277906" cy="878541"/>
+              </a:xfrm>
+            </p:grpSpPr>
+            <p:sp>
+              <p:nvSpPr>
+                <p:cNvPr id="24" name="Rectangle 23"/>
+                <p:cNvSpPr/>
+                <p:nvPr/>
+              </p:nvSpPr>
+              <p:spPr>
+                <a:xfrm>
+                  <a:off x="5109882" y="1837765"/>
+                  <a:ext cx="143436" cy="681317"/>
+                </a:xfrm>
+                <a:prstGeom prst="rect">
+                  <a:avLst/>
+                </a:prstGeom>
+                <a:solidFill>
+                  <a:schemeClr val="bg1"/>
+                </a:solidFill>
+                <a:ln>
+                  <a:noFill/>
+                </a:ln>
+              </p:spPr>
+              <p:style>
+                <a:lnRef idx="2">
+                  <a:schemeClr val="accent1">
+                    <a:shade val="50000"/>
+                  </a:schemeClr>
+                </a:lnRef>
+                <a:fillRef idx="1">
+                  <a:schemeClr val="accent1"/>
+                </a:fillRef>
+                <a:effectRef idx="0">
+                  <a:schemeClr val="accent1"/>
+                </a:effectRef>
+                <a:fontRef idx="minor">
+                  <a:schemeClr val="lt1"/>
+                </a:fontRef>
+              </p:style>
+              <p:txBody>
+                <a:bodyPr rtlCol="0" anchor="ctr"/>
+                <a:lstStyle/>
+                <a:p>
+                  <a:pPr algn="ctr"/>
+                  <a:endParaRPr lang="en-US"/>
+                </a:p>
+              </p:txBody>
+            </p:sp>
+            <p:sp>
+              <p:nvSpPr>
+                <p:cNvPr id="25" name="Oval 24"/>
+                <p:cNvSpPr/>
+                <p:nvPr/>
+              </p:nvSpPr>
+              <p:spPr>
+                <a:xfrm>
+                  <a:off x="5038165" y="1640541"/>
+                  <a:ext cx="277906" cy="259977"/>
+                </a:xfrm>
+                <a:prstGeom prst="ellipse">
+                  <a:avLst/>
+                </a:prstGeom>
+                <a:solidFill>
+                  <a:schemeClr val="bg1"/>
+                </a:solidFill>
+                <a:ln>
+                  <a:noFill/>
+                </a:ln>
+              </p:spPr>
+              <p:style>
+                <a:lnRef idx="2">
+                  <a:schemeClr val="accent1">
+                    <a:shade val="50000"/>
+                  </a:schemeClr>
+                </a:lnRef>
+                <a:fillRef idx="1">
+                  <a:schemeClr val="accent1"/>
+                </a:fillRef>
+                <a:effectRef idx="0">
+                  <a:schemeClr val="accent1"/>
+                </a:effectRef>
+                <a:fontRef idx="minor">
+                  <a:schemeClr val="lt1"/>
+                </a:fontRef>
+              </p:style>
+              <p:txBody>
+                <a:bodyPr rtlCol="0" anchor="ctr"/>
+                <a:lstStyle/>
+                <a:p>
+                  <a:pPr algn="ctr"/>
+                  <a:endParaRPr lang="en-US"/>
+                </a:p>
+              </p:txBody>
+            </p:sp>
+          </p:grpSp>
+          <p:grpSp>
+            <p:nvGrpSpPr>
+              <p:cNvPr id="18" name="Group 17"/>
+              <p:cNvGrpSpPr/>
+              <p:nvPr/>
+            </p:nvGrpSpPr>
+            <p:grpSpPr>
+              <a:xfrm>
+                <a:off x="5957047" y="1640541"/>
+                <a:ext cx="277906" cy="878541"/>
+                <a:chOff x="5038165" y="1640541"/>
+                <a:chExt cx="277906" cy="878541"/>
+              </a:xfrm>
+            </p:grpSpPr>
+            <p:sp>
+              <p:nvSpPr>
+                <p:cNvPr id="22" name="Rectangle 21"/>
+                <p:cNvSpPr/>
+                <p:nvPr/>
+              </p:nvSpPr>
+              <p:spPr>
+                <a:xfrm>
+                  <a:off x="5109882" y="1837765"/>
+                  <a:ext cx="143436" cy="681317"/>
+                </a:xfrm>
+                <a:prstGeom prst="rect">
+                  <a:avLst/>
+                </a:prstGeom>
+                <a:solidFill>
+                  <a:schemeClr val="bg1"/>
+                </a:solidFill>
+                <a:ln>
+                  <a:noFill/>
+                </a:ln>
+              </p:spPr>
+              <p:style>
+                <a:lnRef idx="2">
+                  <a:schemeClr val="accent1">
+                    <a:shade val="50000"/>
+                  </a:schemeClr>
+                </a:lnRef>
+                <a:fillRef idx="1">
+                  <a:schemeClr val="accent1"/>
+                </a:fillRef>
+                <a:effectRef idx="0">
+                  <a:schemeClr val="accent1"/>
+                </a:effectRef>
+                <a:fontRef idx="minor">
+                  <a:schemeClr val="lt1"/>
+                </a:fontRef>
+              </p:style>
+              <p:txBody>
+                <a:bodyPr rtlCol="0" anchor="ctr"/>
+                <a:lstStyle/>
+                <a:p>
+                  <a:pPr algn="ctr"/>
+                  <a:endParaRPr lang="en-US"/>
+                </a:p>
+              </p:txBody>
+            </p:sp>
+            <p:sp>
+              <p:nvSpPr>
+                <p:cNvPr id="23" name="Oval 22"/>
+                <p:cNvSpPr/>
+                <p:nvPr/>
+              </p:nvSpPr>
+              <p:spPr>
+                <a:xfrm>
+                  <a:off x="5038165" y="1640541"/>
+                  <a:ext cx="277906" cy="259977"/>
+                </a:xfrm>
+                <a:prstGeom prst="ellipse">
+                  <a:avLst/>
+                </a:prstGeom>
+                <a:solidFill>
+                  <a:schemeClr val="bg1"/>
+                </a:solidFill>
+                <a:ln>
+                  <a:noFill/>
+                </a:ln>
+              </p:spPr>
+              <p:style>
+                <a:lnRef idx="2">
+                  <a:schemeClr val="accent1">
+                    <a:shade val="50000"/>
+                  </a:schemeClr>
+                </a:lnRef>
+                <a:fillRef idx="1">
+                  <a:schemeClr val="accent1"/>
+                </a:fillRef>
+                <a:effectRef idx="0">
+                  <a:schemeClr val="accent1"/>
+                </a:effectRef>
+                <a:fontRef idx="minor">
+                  <a:schemeClr val="lt1"/>
+                </a:fontRef>
+              </p:style>
+              <p:txBody>
+                <a:bodyPr rtlCol="0" anchor="ctr"/>
+                <a:lstStyle/>
+                <a:p>
+                  <a:pPr algn="ctr"/>
+                  <a:endParaRPr lang="en-US"/>
+                </a:p>
+              </p:txBody>
+            </p:sp>
+          </p:grpSp>
+          <p:grpSp>
+            <p:nvGrpSpPr>
+              <p:cNvPr id="19" name="Group 18"/>
+              <p:cNvGrpSpPr/>
+              <p:nvPr/>
+            </p:nvGrpSpPr>
+            <p:grpSpPr>
+              <a:xfrm>
+                <a:off x="6875929" y="1640541"/>
+                <a:ext cx="277906" cy="878541"/>
+                <a:chOff x="5038165" y="1640541"/>
+                <a:chExt cx="277906" cy="878541"/>
+              </a:xfrm>
+            </p:grpSpPr>
+            <p:sp>
+              <p:nvSpPr>
+                <p:cNvPr id="20" name="Rectangle 19"/>
+                <p:cNvSpPr/>
+                <p:nvPr/>
+              </p:nvSpPr>
+              <p:spPr>
+                <a:xfrm>
+                  <a:off x="5109882" y="1837765"/>
+                  <a:ext cx="143436" cy="681317"/>
+                </a:xfrm>
+                <a:prstGeom prst="rect">
+                  <a:avLst/>
+                </a:prstGeom>
+                <a:solidFill>
+                  <a:schemeClr val="bg1"/>
+                </a:solidFill>
+                <a:ln>
+                  <a:noFill/>
+                </a:ln>
+              </p:spPr>
+              <p:style>
+                <a:lnRef idx="2">
+                  <a:schemeClr val="accent1">
+                    <a:shade val="50000"/>
+                  </a:schemeClr>
+                </a:lnRef>
+                <a:fillRef idx="1">
+                  <a:schemeClr val="accent1"/>
+                </a:fillRef>
+                <a:effectRef idx="0">
+                  <a:schemeClr val="accent1"/>
+                </a:effectRef>
+                <a:fontRef idx="minor">
+                  <a:schemeClr val="lt1"/>
+                </a:fontRef>
+              </p:style>
+              <p:txBody>
+                <a:bodyPr rtlCol="0" anchor="ctr"/>
+                <a:lstStyle/>
+                <a:p>
+                  <a:pPr algn="ctr"/>
+                  <a:endParaRPr lang="en-US"/>
+                </a:p>
+              </p:txBody>
+            </p:sp>
+            <p:sp>
+              <p:nvSpPr>
+                <p:cNvPr id="21" name="Oval 20"/>
+                <p:cNvSpPr/>
+                <p:nvPr/>
+              </p:nvSpPr>
+              <p:spPr>
+                <a:xfrm>
+                  <a:off x="5038165" y="1640541"/>
+                  <a:ext cx="277906" cy="259977"/>
+                </a:xfrm>
+                <a:prstGeom prst="ellipse">
+                  <a:avLst/>
+                </a:prstGeom>
+                <a:solidFill>
+                  <a:schemeClr val="bg1"/>
+                </a:solidFill>
+                <a:ln>
+                  <a:noFill/>
+                </a:ln>
+              </p:spPr>
+              <p:style>
+                <a:lnRef idx="2">
+                  <a:schemeClr val="accent1">
+                    <a:shade val="50000"/>
+                  </a:schemeClr>
+                </a:lnRef>
+                <a:fillRef idx="1">
+                  <a:schemeClr val="accent1"/>
+                </a:fillRef>
+                <a:effectRef idx="0">
+                  <a:schemeClr val="accent1"/>
+                </a:effectRef>
+                <a:fontRef idx="minor">
+                  <a:schemeClr val="lt1"/>
+                </a:fontRef>
+              </p:style>
+              <p:txBody>
+                <a:bodyPr rtlCol="0" anchor="ctr"/>
+                <a:lstStyle/>
+                <a:p>
+                  <a:pPr algn="ctr"/>
+                  <a:endParaRPr lang="en-US"/>
+                </a:p>
+              </p:txBody>
+            </p:sp>
+          </p:grpSp>
+        </p:grpSp>
+        <p:grpSp>
+          <p:nvGrpSpPr>
+            <p:cNvPr id="7" name="Group 6"/>
+            <p:cNvGrpSpPr/>
+            <p:nvPr/>
+          </p:nvGrpSpPr>
+          <p:grpSpPr>
+            <a:xfrm rot="10800000">
+              <a:off x="3370733" y="2673723"/>
+              <a:ext cx="887504" cy="1519517"/>
+              <a:chOff x="7906871" y="2671483"/>
+              <a:chExt cx="887504" cy="1519517"/>
+            </a:xfrm>
+          </p:grpSpPr>
+          <p:grpSp>
+            <p:nvGrpSpPr>
+              <p:cNvPr id="8" name="Group 7"/>
+              <p:cNvGrpSpPr/>
+              <p:nvPr/>
+            </p:nvGrpSpPr>
+            <p:grpSpPr>
+              <a:xfrm rot="5400000">
+                <a:off x="8207189" y="3612776"/>
+                <a:ext cx="277906" cy="878541"/>
+                <a:chOff x="5038165" y="1640541"/>
+                <a:chExt cx="277906" cy="878541"/>
+              </a:xfrm>
+            </p:grpSpPr>
+            <p:sp>
+              <p:nvSpPr>
+                <p:cNvPr id="15" name="Rectangle 14"/>
+                <p:cNvSpPr/>
+                <p:nvPr/>
+              </p:nvSpPr>
+              <p:spPr>
+                <a:xfrm>
+                  <a:off x="5109882" y="1837765"/>
+                  <a:ext cx="143436" cy="681317"/>
+                </a:xfrm>
+                <a:prstGeom prst="rect">
+                  <a:avLst/>
+                </a:prstGeom>
+                <a:solidFill>
+                  <a:schemeClr val="bg1"/>
+                </a:solidFill>
+                <a:ln>
+                  <a:noFill/>
+                </a:ln>
+              </p:spPr>
+              <p:style>
+                <a:lnRef idx="2">
+                  <a:schemeClr val="accent1">
+                    <a:shade val="50000"/>
+                  </a:schemeClr>
+                </a:lnRef>
+                <a:fillRef idx="1">
+                  <a:schemeClr val="accent1"/>
+                </a:fillRef>
+                <a:effectRef idx="0">
+                  <a:schemeClr val="accent1"/>
+                </a:effectRef>
+                <a:fontRef idx="minor">
+                  <a:schemeClr val="lt1"/>
+                </a:fontRef>
+              </p:style>
+              <p:txBody>
+                <a:bodyPr rtlCol="0" anchor="ctr"/>
+                <a:lstStyle/>
+                <a:p>
+                  <a:pPr algn="ctr"/>
+                  <a:endParaRPr lang="en-US"/>
+                </a:p>
+              </p:txBody>
+            </p:sp>
+            <p:sp>
+              <p:nvSpPr>
+                <p:cNvPr id="16" name="Oval 15"/>
+                <p:cNvSpPr/>
+                <p:nvPr/>
+              </p:nvSpPr>
+              <p:spPr>
+                <a:xfrm>
+                  <a:off x="5038165" y="1640541"/>
+                  <a:ext cx="277906" cy="259977"/>
+                </a:xfrm>
+                <a:prstGeom prst="ellipse">
+                  <a:avLst/>
+                </a:prstGeom>
+                <a:solidFill>
+                  <a:schemeClr val="bg1"/>
+                </a:solidFill>
+                <a:ln>
+                  <a:noFill/>
+                </a:ln>
+              </p:spPr>
+              <p:style>
+                <a:lnRef idx="2">
+                  <a:schemeClr val="accent1">
+                    <a:shade val="50000"/>
+                  </a:schemeClr>
+                </a:lnRef>
+                <a:fillRef idx="1">
+                  <a:schemeClr val="accent1"/>
+                </a:fillRef>
+                <a:effectRef idx="0">
+                  <a:schemeClr val="accent1"/>
+                </a:effectRef>
+                <a:fontRef idx="minor">
+                  <a:schemeClr val="lt1"/>
+                </a:fontRef>
+              </p:style>
+              <p:txBody>
+                <a:bodyPr rtlCol="0" anchor="ctr"/>
+                <a:lstStyle/>
+                <a:p>
+                  <a:pPr algn="ctr"/>
+                  <a:endParaRPr lang="en-US"/>
+                </a:p>
+              </p:txBody>
+            </p:sp>
+          </p:grpSp>
+          <p:grpSp>
+            <p:nvGrpSpPr>
+              <p:cNvPr id="9" name="Group 8"/>
+              <p:cNvGrpSpPr/>
+              <p:nvPr/>
+            </p:nvGrpSpPr>
+            <p:grpSpPr>
+              <a:xfrm rot="5400000">
+                <a:off x="8211672" y="2994212"/>
+                <a:ext cx="277906" cy="878541"/>
+                <a:chOff x="5038165" y="1640541"/>
+                <a:chExt cx="277906" cy="878541"/>
+              </a:xfrm>
+            </p:grpSpPr>
+            <p:sp>
+              <p:nvSpPr>
+                <p:cNvPr id="13" name="Rectangle 12"/>
+                <p:cNvSpPr/>
+                <p:nvPr/>
+              </p:nvSpPr>
+              <p:spPr>
+                <a:xfrm>
+                  <a:off x="5109882" y="1837765"/>
+                  <a:ext cx="143436" cy="681317"/>
+                </a:xfrm>
+                <a:prstGeom prst="rect">
+                  <a:avLst/>
+                </a:prstGeom>
+                <a:solidFill>
+                  <a:schemeClr val="bg1"/>
+                </a:solidFill>
+                <a:ln>
+                  <a:noFill/>
+                </a:ln>
+              </p:spPr>
+              <p:style>
+                <a:lnRef idx="2">
+                  <a:schemeClr val="accent1">
+                    <a:shade val="50000"/>
+                  </a:schemeClr>
+                </a:lnRef>
+                <a:fillRef idx="1">
+                  <a:schemeClr val="accent1"/>
+                </a:fillRef>
+                <a:effectRef idx="0">
+                  <a:schemeClr val="accent1"/>
+                </a:effectRef>
+                <a:fontRef idx="minor">
+                  <a:schemeClr val="lt1"/>
+                </a:fontRef>
+              </p:style>
+              <p:txBody>
+                <a:bodyPr rtlCol="0" anchor="ctr"/>
+                <a:lstStyle/>
+                <a:p>
+                  <a:pPr algn="ctr"/>
+                  <a:endParaRPr lang="en-US"/>
+                </a:p>
+              </p:txBody>
+            </p:sp>
+            <p:sp>
+              <p:nvSpPr>
+                <p:cNvPr id="14" name="Oval 13"/>
+                <p:cNvSpPr/>
+                <p:nvPr/>
+              </p:nvSpPr>
+              <p:spPr>
+                <a:xfrm>
+                  <a:off x="5038165" y="1640541"/>
+                  <a:ext cx="277906" cy="259977"/>
+                </a:xfrm>
+                <a:prstGeom prst="ellipse">
+                  <a:avLst/>
+                </a:prstGeom>
+                <a:solidFill>
+                  <a:schemeClr val="bg1"/>
+                </a:solidFill>
+                <a:ln>
+                  <a:noFill/>
+                </a:ln>
+              </p:spPr>
+              <p:style>
+                <a:lnRef idx="2">
+                  <a:schemeClr val="accent1">
+                    <a:shade val="50000"/>
+                  </a:schemeClr>
+                </a:lnRef>
+                <a:fillRef idx="1">
+                  <a:schemeClr val="accent1"/>
+                </a:fillRef>
+                <a:effectRef idx="0">
+                  <a:schemeClr val="accent1"/>
+                </a:effectRef>
+                <a:fontRef idx="minor">
+                  <a:schemeClr val="lt1"/>
+                </a:fontRef>
+              </p:style>
+              <p:txBody>
+                <a:bodyPr rtlCol="0" anchor="ctr"/>
+                <a:lstStyle/>
+                <a:p>
+                  <a:pPr algn="ctr"/>
+                  <a:endParaRPr lang="en-US"/>
+                </a:p>
+              </p:txBody>
+            </p:sp>
+          </p:grpSp>
+          <p:grpSp>
+            <p:nvGrpSpPr>
+              <p:cNvPr id="10" name="Group 9"/>
+              <p:cNvGrpSpPr/>
+              <p:nvPr/>
+            </p:nvGrpSpPr>
+            <p:grpSpPr>
+              <a:xfrm rot="5400000">
+                <a:off x="8216152" y="2371165"/>
+                <a:ext cx="277906" cy="878541"/>
+                <a:chOff x="5038165" y="1640541"/>
+                <a:chExt cx="277906" cy="878541"/>
+              </a:xfrm>
+            </p:grpSpPr>
+            <p:sp>
+              <p:nvSpPr>
+                <p:cNvPr id="11" name="Rectangle 10"/>
+                <p:cNvSpPr/>
+                <p:nvPr/>
+              </p:nvSpPr>
+              <p:spPr>
+                <a:xfrm>
+                  <a:off x="5109882" y="1837765"/>
+                  <a:ext cx="143436" cy="681317"/>
+                </a:xfrm>
+                <a:prstGeom prst="rect">
+                  <a:avLst/>
+                </a:prstGeom>
+                <a:solidFill>
+                  <a:schemeClr val="bg1"/>
+                </a:solidFill>
+                <a:ln>
+                  <a:noFill/>
+                </a:ln>
+              </p:spPr>
+              <p:style>
+                <a:lnRef idx="2">
+                  <a:schemeClr val="accent1">
+                    <a:shade val="50000"/>
+                  </a:schemeClr>
+                </a:lnRef>
+                <a:fillRef idx="1">
+                  <a:schemeClr val="accent1"/>
+                </a:fillRef>
+                <a:effectRef idx="0">
+                  <a:schemeClr val="accent1"/>
+                </a:effectRef>
+                <a:fontRef idx="minor">
+                  <a:schemeClr val="lt1"/>
+                </a:fontRef>
+              </p:style>
+              <p:txBody>
+                <a:bodyPr rtlCol="0" anchor="ctr"/>
+                <a:lstStyle/>
+                <a:p>
+                  <a:pPr algn="ctr"/>
+                  <a:endParaRPr lang="en-US"/>
+                </a:p>
+              </p:txBody>
+            </p:sp>
+            <p:sp>
+              <p:nvSpPr>
+                <p:cNvPr id="12" name="Oval 11"/>
+                <p:cNvSpPr/>
+                <p:nvPr/>
+              </p:nvSpPr>
+              <p:spPr>
+                <a:xfrm>
+                  <a:off x="5038165" y="1640541"/>
+                  <a:ext cx="277906" cy="259977"/>
+                </a:xfrm>
+                <a:prstGeom prst="ellipse">
+                  <a:avLst/>
+                </a:prstGeom>
+                <a:solidFill>
+                  <a:schemeClr val="bg1"/>
+                </a:solidFill>
+                <a:ln>
+                  <a:noFill/>
+                </a:ln>
+              </p:spPr>
+              <p:style>
+                <a:lnRef idx="2">
+                  <a:schemeClr val="accent1">
+                    <a:shade val="50000"/>
+                  </a:schemeClr>
+                </a:lnRef>
+                <a:fillRef idx="1">
+                  <a:schemeClr val="accent1"/>
+                </a:fillRef>
+                <a:effectRef idx="0">
+                  <a:schemeClr val="accent1"/>
+                </a:effectRef>
+                <a:fontRef idx="minor">
+                  <a:schemeClr val="lt1"/>
+                </a:fontRef>
+              </p:style>
+              <p:txBody>
+                <a:bodyPr rtlCol="0" anchor="ctr"/>
+                <a:lstStyle/>
+                <a:p>
+                  <a:pPr algn="ctr"/>
+                  <a:endParaRPr lang="en-US"/>
+                </a:p>
+              </p:txBody>
+            </p:sp>
+          </p:grpSp>
+        </p:grpSp>
+      </p:grpSp>
+      <p:sp>
+        <p:nvSpPr>
+          <p:cNvPr id="44" name="TextBox 43"/>
+          <p:cNvSpPr txBox="1"/>
+          <p:nvPr/>
+        </p:nvSpPr>
+        <p:spPr>
+          <a:xfrm>
+            <a:off x="4727790" y="2479375"/>
+            <a:ext cx="2718489" cy="1908215"/>
+          </a:xfrm>
+          <a:prstGeom prst="rect">
+            <a:avLst/>
+          </a:prstGeom>
+          <a:noFill/>
+        </p:spPr>
+        <p:txBody>
+          <a:bodyPr wrap="square" rtlCol="0">
+            <a:spAutoFit/>
+          </a:bodyPr>
+          <a:lstStyle/>
+          <a:p>
+            <a:r>
+              <a:rPr lang="en-US" sz="11800" dirty="0" smtClean="0"/>
+              <a:t>CPU</a:t>
+            </a:r>
+            <a:endParaRPr lang="en-US" sz="11800" dirty="0"/>
+          </a:p>
+        </p:txBody>
+      </p:sp>
+    </p:spTree>
+    <p:extLst>
+      <p:ext uri="{BB962C8B-B14F-4D97-AF65-F5344CB8AC3E}">
+        <p14:creationId xmlns:p14="http://schemas.microsoft.com/office/powerpoint/2010/main" val="502426026"/>
+      </p:ext>
+    </p:extLst>
+  </p:cSld>
+  <p:clrMapOvr>
+    <a:masterClrMapping/>
+  </p:clrMapOvr>
+</p:sld>
+</file>
+
+<file path=ppt/slides/slide3.xml><?xml version="1.0" encoding="utf-8"?>
 <p:sld xmlns:a="http://schemas.openxmlformats.org/drawingml/2006/main" xmlns:r="http://schemas.openxmlformats.org/officeDocument/2006/relationships" xmlns:p="http://schemas.openxmlformats.org/presentationml/2006/main">
   <p:cSld>
     <p:spTree>
@@ -4573,7 +6073,7 @@
 </p:sld>
 </file>
 
-<file path=ppt/slides/slide3.xml><?xml version="1.0" encoding="utf-8"?>
+<file path=ppt/slides/slide4.xml><?xml version="1.0" encoding="utf-8"?>
 <p:sld xmlns:a="http://schemas.openxmlformats.org/drawingml/2006/main" xmlns:r="http://schemas.openxmlformats.org/officeDocument/2006/relationships" xmlns:p="http://schemas.openxmlformats.org/presentationml/2006/main">
   <p:cSld>
     <p:spTree>

</xml_diff>